<commit_message>
textchanges + pictures added
</commit_message>
<xml_diff>
--- a/Präsentationen/präs_MMI_Nomadic Acceptance_3.pptx
+++ b/Präsentationen/präs_MMI_Nomadic Acceptance_3.pptx
@@ -5,10 +5,10 @@
     <p:sldMasterId id="2147483648" r:id="rId1"/>
   </p:sldMasterIdLst>
   <p:notesMasterIdLst>
-    <p:notesMasterId r:id="rId9"/>
+    <p:notesMasterId r:id="rId10"/>
   </p:notesMasterIdLst>
   <p:handoutMasterIdLst>
-    <p:handoutMasterId r:id="rId10"/>
+    <p:handoutMasterId r:id="rId11"/>
   </p:handoutMasterIdLst>
   <p:sldIdLst>
     <p:sldId id="256" r:id="rId2"/>
@@ -18,6 +18,7 @@
     <p:sldId id="260" r:id="rId6"/>
     <p:sldId id="261" r:id="rId7"/>
     <p:sldId id="262" r:id="rId8"/>
+    <p:sldId id="263" r:id="rId9"/>
   </p:sldIdLst>
   <p:sldSz cx="9144000" cy="6858000" type="screen4x3"/>
   <p:notesSz cx="6858000" cy="9144000"/>
@@ -232,7 +233,7 @@
             <a:fld id="{350B7780-B50B-474C-85C6-0B4009B6F014}" type="datetimeFigureOut">
               <a:rPr lang="de-DE" smtClean="0"/>
               <a:pPr/>
-              <a:t>17.06.2019</a:t>
+              <a:t>18.06.2019</a:t>
             </a:fld>
             <a:endParaRPr lang="de-DE"/>
           </a:p>
@@ -399,7 +400,7 @@
             <a:fld id="{19FFB102-D3AF-431C-A902-ADE5B2A48608}" type="datetimeFigureOut">
               <a:rPr lang="de-DE" smtClean="0"/>
               <a:pPr/>
-              <a:t>17.06.2019</a:t>
+              <a:t>18.06.2019</a:t>
             </a:fld>
             <a:endParaRPr lang="de-DE"/>
           </a:p>
@@ -712,7 +713,7 @@
             <a:fld id="{1BA50D42-C9CD-4801-B293-61D1F53EC57E}" type="datetimeFigureOut">
               <a:rPr lang="de-DE" smtClean="0"/>
               <a:pPr/>
-              <a:t>17.06.2019</a:t>
+              <a:t>18.06.2019</a:t>
             </a:fld>
             <a:endParaRPr lang="de-DE"/>
           </a:p>
@@ -2612,6 +2613,13 @@
           <a:p>
             <a:pPr indent="0"/>
             <a:r>
+              <a:rPr lang="de-DE" b="1" dirty="0"/>
+              <a:t>Topic</a:t>
+            </a:r>
+          </a:p>
+          <a:p>
+            <a:pPr indent="0"/>
+            <a:r>
               <a:rPr lang="de-DE" dirty="0"/>
               <a:t>The </a:t>
             </a:r>
@@ -2759,14 +2767,6 @@
               <a:rPr lang="de-DE" dirty="0"/>
               <a:t>.</a:t>
             </a:r>
-          </a:p>
-          <a:p>
-            <a:pPr indent="0"/>
-            <a:endParaRPr lang="de-DE" dirty="0"/>
-          </a:p>
-          <a:p>
-            <a:pPr indent="0"/>
-            <a:endParaRPr lang="de-DE" dirty="0"/>
           </a:p>
         </p:txBody>
       </p:sp>
@@ -2854,25 +2854,25 @@
               <a:rPr lang="de-DE" dirty="0">
                 <a:latin typeface="Frutiger Next LT W1G"/>
               </a:rPr>
-              <a:t>Research </a:t>
+              <a:t>[2] The </a:t>
             </a:r>
             <a:r>
               <a:rPr lang="de-DE" dirty="0" err="1">
                 <a:latin typeface="Frutiger Next LT W1G"/>
               </a:rPr>
-              <a:t>showed</a:t>
+              <a:t>user´s</a:t>
             </a:r>
             <a:r>
               <a:rPr lang="de-DE" dirty="0">
                 <a:latin typeface="Frutiger Next LT W1G"/>
               </a:rPr>
-              <a:t> VR </a:t>
+              <a:t> </a:t>
             </a:r>
             <a:r>
               <a:rPr lang="de-DE" dirty="0" err="1">
                 <a:latin typeface="Frutiger Next LT W1G"/>
               </a:rPr>
-              <a:t>glasses</a:t>
+              <a:t>surrounding</a:t>
             </a:r>
             <a:r>
               <a:rPr lang="de-DE" dirty="0">
@@ -2884,7 +2884,7 @@
               <a:rPr lang="de-DE" dirty="0" err="1">
                 <a:latin typeface="Frutiger Next LT W1G"/>
               </a:rPr>
-              <a:t>might</a:t>
+              <a:t>divided</a:t>
             </a:r>
             <a:r>
               <a:rPr lang="de-DE" dirty="0">
@@ -2896,7 +2896,7 @@
               <a:rPr lang="de-DE" dirty="0" err="1">
                 <a:latin typeface="Frutiger Next LT W1G"/>
               </a:rPr>
-              <a:t>be</a:t>
+              <a:t>into</a:t>
             </a:r>
             <a:r>
               <a:rPr lang="de-DE" dirty="0">
@@ -2908,113 +2908,299 @@
               <a:rPr lang="de-DE" dirty="0" err="1">
                 <a:latin typeface="Frutiger Next LT W1G"/>
               </a:rPr>
-              <a:t>acceptable</a:t>
+              <a:t>public</a:t>
             </a:r>
             <a:r>
               <a:rPr lang="de-DE" dirty="0">
                 <a:latin typeface="Frutiger Next LT W1G"/>
               </a:rPr>
+              <a:t>, </a:t>
+            </a:r>
+            <a:r>
+              <a:rPr lang="de-DE" dirty="0" err="1">
+                <a:latin typeface="Frutiger Next LT W1G"/>
+              </a:rPr>
+              <a:t>semi</a:t>
+            </a:r>
+            <a:r>
+              <a:rPr lang="de-DE" dirty="0">
+                <a:latin typeface="Frutiger Next LT W1G"/>
+              </a:rPr>
+              <a:t> </a:t>
+            </a:r>
+            <a:r>
+              <a:rPr lang="de-DE" dirty="0" err="1">
+                <a:latin typeface="Frutiger Next LT W1G"/>
+              </a:rPr>
+              <a:t>public</a:t>
+            </a:r>
+            <a:r>
+              <a:rPr lang="de-DE" dirty="0">
+                <a:latin typeface="Frutiger Next LT W1G"/>
+              </a:rPr>
+              <a:t> and private, </a:t>
+            </a:r>
+            <a:r>
+              <a:rPr lang="de-DE" dirty="0" err="1">
+                <a:latin typeface="Frutiger Next LT W1G"/>
+              </a:rPr>
+              <a:t>plays</a:t>
+            </a:r>
+            <a:r>
+              <a:rPr lang="de-DE" dirty="0">
+                <a:latin typeface="Frutiger Next LT W1G"/>
+              </a:rPr>
+              <a:t> an </a:t>
+            </a:r>
+            <a:r>
+              <a:rPr lang="de-DE" dirty="0" err="1">
+                <a:latin typeface="Frutiger Next LT W1G"/>
+              </a:rPr>
+              <a:t>important</a:t>
+            </a:r>
+            <a:r>
+              <a:rPr lang="de-DE" dirty="0">
+                <a:latin typeface="Frutiger Next LT W1G"/>
+              </a:rPr>
+              <a:t> </a:t>
+            </a:r>
+            <a:r>
+              <a:rPr lang="de-DE" dirty="0" err="1">
+                <a:latin typeface="Frutiger Next LT W1G"/>
+              </a:rPr>
+              <a:t>role</a:t>
+            </a:r>
+            <a:r>
+              <a:rPr lang="de-DE" dirty="0">
+                <a:latin typeface="Frutiger Next LT W1G"/>
+              </a:rPr>
               <a:t> in </a:t>
             </a:r>
             <a:r>
               <a:rPr lang="de-DE" dirty="0" err="1">
                 <a:latin typeface="Frutiger Next LT W1G"/>
               </a:rPr>
-              <a:t>certain</a:t>
+              <a:t>his</a:t>
             </a:r>
             <a:r>
               <a:rPr lang="de-DE" dirty="0">
                 <a:latin typeface="Frutiger Next LT W1G"/>
               </a:rPr>
-              <a:t> social </a:t>
+              <a:t> </a:t>
             </a:r>
             <a:r>
               <a:rPr lang="de-DE" dirty="0" err="1">
                 <a:latin typeface="Frutiger Next LT W1G"/>
               </a:rPr>
-              <a:t>situations</a:t>
+              <a:t>decision</a:t>
+            </a:r>
+            <a:r>
+              <a:rPr lang="de-DE" dirty="0">
+                <a:latin typeface="Frutiger Next LT W1G"/>
+              </a:rPr>
+              <a:t> </a:t>
+            </a:r>
+            <a:r>
+              <a:rPr lang="de-DE" dirty="0" err="1">
+                <a:latin typeface="Frutiger Next LT W1G"/>
+              </a:rPr>
+              <a:t>to</a:t>
+            </a:r>
+            <a:r>
+              <a:rPr lang="de-DE" dirty="0">
+                <a:latin typeface="Frutiger Next LT W1G"/>
+              </a:rPr>
+              <a:t> </a:t>
+            </a:r>
+            <a:r>
+              <a:rPr lang="de-DE" dirty="0" err="1">
+                <a:latin typeface="Frutiger Next LT W1G"/>
+              </a:rPr>
+              <a:t>interact</a:t>
+            </a:r>
+            <a:r>
+              <a:rPr lang="de-DE" dirty="0">
+                <a:latin typeface="Frutiger Next LT W1G"/>
+              </a:rPr>
+              <a:t> </a:t>
+            </a:r>
+            <a:r>
+              <a:rPr lang="de-DE" dirty="0" err="1">
+                <a:latin typeface="Frutiger Next LT W1G"/>
+              </a:rPr>
+              <a:t>with</a:t>
+            </a:r>
+            <a:r>
+              <a:rPr lang="de-DE" dirty="0">
+                <a:latin typeface="Frutiger Next LT W1G"/>
+              </a:rPr>
+              <a:t> a </a:t>
+            </a:r>
+            <a:r>
+              <a:rPr lang="de-DE" dirty="0" err="1">
+                <a:latin typeface="Frutiger Next LT W1G"/>
+              </a:rPr>
+              <a:t>device</a:t>
+            </a:r>
+            <a:r>
+              <a:rPr lang="de-DE" dirty="0">
+                <a:latin typeface="Frutiger Next LT W1G"/>
+              </a:rPr>
+              <a:t> / </a:t>
+            </a:r>
+            <a:r>
+              <a:rPr lang="de-DE" dirty="0" err="1">
+                <a:latin typeface="Frutiger Next LT W1G"/>
+              </a:rPr>
+              <a:t>fullfill</a:t>
+            </a:r>
+            <a:r>
+              <a:rPr lang="de-DE" dirty="0">
+                <a:latin typeface="Frutiger Next LT W1G"/>
+              </a:rPr>
+              <a:t> </a:t>
+            </a:r>
+            <a:r>
+              <a:rPr lang="de-DE" dirty="0" err="1">
+                <a:latin typeface="Frutiger Next LT W1G"/>
+              </a:rPr>
+              <a:t>gestures</a:t>
             </a:r>
             <a:endParaRPr lang="de-DE" dirty="0">
               <a:latin typeface="Frutiger Next LT W1G"/>
             </a:endParaRPr>
           </a:p>
           <a:p>
-            <a:pPr lvl="1" indent="0"/>
+            <a:pPr marL="1028700" lvl="1">
+              <a:buFont typeface="Wingdings" panose="05000000000000000000" pitchFamily="2" charset="2"/>
+              <a:buChar char="Ø"/>
+            </a:pPr>
+            <a:r>
+              <a:rPr lang="de-DE" dirty="0" err="1">
+                <a:latin typeface="Frutiger Next LT W1G"/>
+              </a:rPr>
+              <a:t>Result</a:t>
+            </a:r>
             <a:r>
               <a:rPr lang="de-DE" dirty="0">
                 <a:latin typeface="Frutiger Next LT W1G"/>
-                <a:sym typeface="Wingdings" panose="05000000000000000000" pitchFamily="2" charset="2"/>
-              </a:rPr>
-              <a:t></a:t>
+              </a:rPr>
+              <a:t>: </a:t>
             </a:r>
             <a:r>
               <a:rPr lang="de-DE" dirty="0" err="1">
                 <a:latin typeface="Frutiger Next LT W1G"/>
-                <a:sym typeface="Wingdings" panose="05000000000000000000" pitchFamily="2" charset="2"/>
-              </a:rPr>
-              <a:t>based</a:t>
+              </a:rPr>
+              <a:t>people</a:t>
             </a:r>
             <a:r>
               <a:rPr lang="de-DE" dirty="0">
                 <a:latin typeface="Frutiger Next LT W1G"/>
-                <a:sym typeface="Wingdings" panose="05000000000000000000" pitchFamily="2" charset="2"/>
-              </a:rPr>
-              <a:t> on digital </a:t>
+              </a:rPr>
+              <a:t> </a:t>
             </a:r>
             <a:r>
               <a:rPr lang="de-DE" dirty="0" err="1">
                 <a:latin typeface="Frutiger Next LT W1G"/>
-                <a:sym typeface="Wingdings" panose="05000000000000000000" pitchFamily="2" charset="2"/>
-              </a:rPr>
-              <a:t>questionnaires</a:t>
+              </a:rPr>
+              <a:t>feel</a:t>
             </a:r>
             <a:r>
               <a:rPr lang="de-DE" dirty="0">
                 <a:latin typeface="Frutiger Next LT W1G"/>
-                <a:sym typeface="Wingdings" panose="05000000000000000000" pitchFamily="2" charset="2"/>
-              </a:rPr>
-              <a:t> and </a:t>
+              </a:rPr>
+              <a:t> </a:t>
             </a:r>
             <a:r>
               <a:rPr lang="de-DE" dirty="0" err="1">
                 <a:latin typeface="Frutiger Next LT W1G"/>
-                <a:sym typeface="Wingdings" panose="05000000000000000000" pitchFamily="2" charset="2"/>
-              </a:rPr>
-              <a:t>images</a:t>
-            </a:r>
-            <a:endParaRPr lang="de-DE" dirty="0">
-              <a:latin typeface="Frutiger Next LT W1G"/>
-              <a:sym typeface="Wingdings" panose="05000000000000000000" pitchFamily="2" charset="2"/>
-            </a:endParaRPr>
-          </a:p>
-          <a:p>
-            <a:pPr lvl="1" indent="0"/>
+              </a:rPr>
+              <a:t>more</a:t>
+            </a:r>
             <a:r>
               <a:rPr lang="de-DE" dirty="0">
                 <a:latin typeface="Frutiger Next LT W1G"/>
-                <a:sym typeface="Wingdings" panose="05000000000000000000" pitchFamily="2" charset="2"/>
-              </a:rPr>
-              <a:t>	</a:t>
-            </a:r>
-            <a:r>
-              <a:rPr lang="de-DE">
-                <a:latin typeface="Frutiger Next LT W1G"/>
-                <a:sym typeface="Wingdings" panose="05000000000000000000" pitchFamily="2" charset="2"/>
-              </a:rPr>
-              <a:t>	</a:t>
+              </a:rPr>
+              <a:t> </a:t>
+            </a:r>
+            <a:r>
+              <a:rPr lang="de-DE" dirty="0" err="1">
+                <a:latin typeface="Frutiger Next LT W1G"/>
+              </a:rPr>
+              <a:t>comfortable</a:t>
+            </a:r>
+            <a:r>
+              <a:rPr lang="de-DE" dirty="0">
+                <a:latin typeface="Frutiger Next LT W1G"/>
+              </a:rPr>
+              <a:t> </a:t>
+            </a:r>
+            <a:r>
+              <a:rPr lang="de-DE" dirty="0" err="1">
+                <a:latin typeface="Frutiger Next LT W1G"/>
+              </a:rPr>
+              <a:t>to</a:t>
+            </a:r>
+            <a:r>
+              <a:rPr lang="de-DE" dirty="0">
+                <a:latin typeface="Frutiger Next LT W1G"/>
+              </a:rPr>
+              <a:t> perform </a:t>
+            </a:r>
+            <a:r>
+              <a:rPr lang="de-DE" dirty="0" err="1">
+                <a:latin typeface="Frutiger Next LT W1G"/>
+              </a:rPr>
+              <a:t>gestures</a:t>
+            </a:r>
+            <a:r>
+              <a:rPr lang="de-DE" dirty="0">
+                <a:latin typeface="Frutiger Next LT W1G"/>
+              </a:rPr>
+              <a:t> in </a:t>
+            </a:r>
+            <a:r>
+              <a:rPr lang="de-DE" dirty="0" err="1">
+                <a:latin typeface="Frutiger Next LT W1G"/>
+              </a:rPr>
+              <a:t>privacy</a:t>
+            </a:r>
+            <a:r>
+              <a:rPr lang="de-DE" dirty="0">
+                <a:latin typeface="Frutiger Next LT W1G"/>
+              </a:rPr>
+              <a:t> </a:t>
+            </a:r>
+            <a:r>
+              <a:rPr lang="de-DE" dirty="0" err="1">
+                <a:latin typeface="Frutiger Next LT W1G"/>
+              </a:rPr>
+              <a:t>than</a:t>
+            </a:r>
+            <a:r>
+              <a:rPr lang="de-DE" dirty="0">
+                <a:latin typeface="Frutiger Next LT W1G"/>
+              </a:rPr>
+              <a:t> in </a:t>
+            </a:r>
+            <a:r>
+              <a:rPr lang="de-DE" dirty="0" err="1">
+                <a:latin typeface="Frutiger Next LT W1G"/>
+              </a:rPr>
+              <a:t>public</a:t>
             </a:r>
             <a:endParaRPr lang="de-DE" dirty="0">
               <a:latin typeface="Frutiger Next LT W1G"/>
             </a:endParaRPr>
           </a:p>
           <a:p>
-            <a:pPr indent="0"/>
+            <a:pPr lvl="1" indent="0"/>
             <a:endParaRPr lang="de-DE" dirty="0">
               <a:latin typeface="Frutiger Next LT W1G"/>
             </a:endParaRPr>
           </a:p>
           <a:p>
-            <a:pPr marL="285750" indent="-285750">
+            <a:pPr marL="285750">
               <a:buFont typeface="Arial" panose="020B0604020202020204" pitchFamily="34" charset="0"/>
               <a:buChar char="•"/>
             </a:pPr>
@@ -3022,13 +3208,13 @@
               <a:rPr lang="de-DE" dirty="0">
                 <a:latin typeface="Frutiger Next LT W1G"/>
               </a:rPr>
-              <a:t>WEAR-</a:t>
+              <a:t>[3] VR </a:t>
             </a:r>
             <a:r>
               <a:rPr lang="de-DE" dirty="0" err="1">
                 <a:latin typeface="Frutiger Next LT W1G"/>
               </a:rPr>
-              <a:t>Scale</a:t>
+              <a:t>goggles</a:t>
             </a:r>
             <a:r>
               <a:rPr lang="de-DE" dirty="0">
@@ -3040,14 +3226,62 @@
               <a:rPr lang="de-DE" dirty="0" err="1">
                 <a:latin typeface="Frutiger Next LT W1G"/>
               </a:rPr>
-              <a:t>document</a:t>
+              <a:t>evoke</a:t>
+            </a:r>
+            <a:r>
+              <a:rPr lang="de-DE" dirty="0">
+                <a:latin typeface="Frutiger Next LT W1G"/>
+              </a:rPr>
+              <a:t> </a:t>
+            </a:r>
+            <a:r>
+              <a:rPr lang="de-DE" dirty="0" err="1">
+                <a:latin typeface="Frutiger Next LT W1G"/>
+              </a:rPr>
+              <a:t>competence</a:t>
+            </a:r>
+            <a:r>
+              <a:rPr lang="de-DE" dirty="0">
+                <a:latin typeface="Frutiger Next LT W1G"/>
+              </a:rPr>
+              <a:t> </a:t>
+            </a:r>
+            <a:r>
+              <a:rPr lang="de-DE" dirty="0" err="1">
+                <a:latin typeface="Frutiger Next LT W1G"/>
+              </a:rPr>
+              <a:t>rather</a:t>
+            </a:r>
+            <a:r>
+              <a:rPr lang="de-DE" dirty="0">
+                <a:latin typeface="Frutiger Next LT W1G"/>
+              </a:rPr>
+              <a:t> </a:t>
+            </a:r>
+            <a:r>
+              <a:rPr lang="de-DE" dirty="0" err="1">
+                <a:latin typeface="Frutiger Next LT W1G"/>
+              </a:rPr>
+              <a:t>than</a:t>
+            </a:r>
+            <a:r>
+              <a:rPr lang="de-DE" dirty="0">
+                <a:latin typeface="Frutiger Next LT W1G"/>
+              </a:rPr>
+              <a:t> </a:t>
+            </a:r>
+            <a:r>
+              <a:rPr lang="de-DE" dirty="0" err="1">
+                <a:latin typeface="Frutiger Next LT W1G"/>
+              </a:rPr>
+              <a:t>warmth</a:t>
             </a:r>
             <a:endParaRPr lang="de-DE" dirty="0">
               <a:latin typeface="Frutiger Next LT W1G"/>
             </a:endParaRPr>
           </a:p>
           <a:p>
-            <a:pPr marL="285750" indent="-285750">
+            <a:pPr marL="285750">
               <a:buFont typeface="Arial" panose="020B0604020202020204" pitchFamily="34" charset="0"/>
               <a:buChar char="•"/>
             </a:pPr>
@@ -3056,44 +3290,104 @@
             </a:endParaRPr>
           </a:p>
           <a:p>
-            <a:pPr indent="0"/>
-            <a:endParaRPr lang="de-DE" dirty="0">
-              <a:latin typeface="Frutiger Next LT W1G"/>
-            </a:endParaRPr>
-          </a:p>
-          <a:p>
-            <a:pPr marL="285750" indent="-285750">
+            <a:pPr marL="285750">
               <a:buFont typeface="Arial" panose="020B0604020202020204" pitchFamily="34" charset="0"/>
               <a:buChar char="•"/>
             </a:pPr>
             <a:r>
+              <a:rPr lang="de-DE" dirty="0">
+                <a:latin typeface="Frutiger Next LT W1G"/>
+              </a:rPr>
+              <a:t>[4] The </a:t>
+            </a:r>
+            <a:r>
               <a:rPr lang="de-DE" dirty="0" err="1">
                 <a:latin typeface="Frutiger Next LT W1G"/>
               </a:rPr>
-              <a:t>No</a:t>
+              <a:t>usage</a:t>
             </a:r>
             <a:r>
               <a:rPr lang="de-DE" dirty="0">
                 <a:latin typeface="Frutiger Next LT W1G"/>
               </a:rPr>
-              <a:t> WEAR-</a:t>
+              <a:t> </a:t>
             </a:r>
             <a:r>
               <a:rPr lang="de-DE" dirty="0" err="1">
                 <a:latin typeface="Frutiger Next LT W1G"/>
               </a:rPr>
-              <a:t>Scale</a:t>
+              <a:t>of</a:t>
             </a:r>
             <a:r>
               <a:rPr lang="de-DE" dirty="0">
                 <a:latin typeface="Frutiger Next LT W1G"/>
               </a:rPr>
-              <a:t> </a:t>
+              <a:t> VR </a:t>
             </a:r>
             <a:r>
               <a:rPr lang="de-DE" dirty="0" err="1">
                 <a:latin typeface="Frutiger Next LT W1G"/>
               </a:rPr>
+              <a:t>goggles</a:t>
+            </a:r>
+            <a:r>
+              <a:rPr lang="de-DE" dirty="0">
+                <a:latin typeface="Frutiger Next LT W1G"/>
+              </a:rPr>
+              <a:t> in </a:t>
+            </a:r>
+            <a:r>
+              <a:rPr lang="de-DE" dirty="0" err="1">
+                <a:latin typeface="Frutiger Next LT W1G"/>
+              </a:rPr>
+              <a:t>privacy</a:t>
+            </a:r>
+            <a:r>
+              <a:rPr lang="de-DE" dirty="0">
+                <a:latin typeface="Frutiger Next LT W1G"/>
+              </a:rPr>
+              <a:t> </a:t>
+            </a:r>
+            <a:r>
+              <a:rPr lang="de-DE" dirty="0" err="1">
+                <a:latin typeface="Frutiger Next LT W1G"/>
+              </a:rPr>
+              <a:t>is</a:t>
+            </a:r>
+            <a:r>
+              <a:rPr lang="de-DE" dirty="0">
+                <a:latin typeface="Frutiger Next LT W1G"/>
+              </a:rPr>
+              <a:t> </a:t>
+            </a:r>
+            <a:r>
+              <a:rPr lang="de-DE" dirty="0" err="1">
+                <a:latin typeface="Frutiger Next LT W1G"/>
+              </a:rPr>
+              <a:t>more</a:t>
+            </a:r>
+            <a:r>
+              <a:rPr lang="de-DE" dirty="0">
+                <a:latin typeface="Frutiger Next LT W1G"/>
+              </a:rPr>
+              <a:t> </a:t>
+            </a:r>
+            <a:r>
+              <a:rPr lang="de-DE" dirty="0" err="1">
+                <a:latin typeface="Frutiger Next LT W1G"/>
+              </a:rPr>
+              <a:t>accepted</a:t>
+            </a:r>
+            <a:r>
+              <a:rPr lang="de-DE" dirty="0">
+                <a:latin typeface="Frutiger Next LT W1G"/>
+              </a:rPr>
+              <a:t> </a:t>
+            </a:r>
+            <a:r>
+              <a:rPr lang="de-DE" dirty="0" err="1">
+                <a:latin typeface="Frutiger Next LT W1G"/>
+              </a:rPr>
               <a:t>as</a:t>
             </a:r>
             <a:r>
@@ -3106,19 +3400,19 @@
               <a:rPr lang="de-DE" dirty="0" err="1">
                 <a:latin typeface="Frutiger Next LT W1G"/>
               </a:rPr>
-              <a:t>questionnaire</a:t>
+              <a:t>long</a:t>
             </a:r>
             <a:r>
               <a:rPr lang="de-DE" dirty="0">
                 <a:latin typeface="Frutiger Next LT W1G"/>
               </a:rPr>
-              <a:t> (</a:t>
+              <a:t> </a:t>
             </a:r>
             <a:r>
               <a:rPr lang="de-DE" dirty="0" err="1">
                 <a:latin typeface="Frutiger Next LT W1G"/>
               </a:rPr>
-              <a:t>too</a:t>
+              <a:t>as</a:t>
             </a:r>
             <a:r>
               <a:rPr lang="de-DE" dirty="0">
@@ -3130,110 +3424,92 @@
               <a:rPr lang="de-DE" dirty="0" err="1">
                 <a:latin typeface="Frutiger Next LT W1G"/>
               </a:rPr>
-              <a:t>long</a:t>
+              <a:t>there</a:t>
             </a:r>
             <a:r>
               <a:rPr lang="de-DE" dirty="0">
                 <a:latin typeface="Frutiger Next LT W1G"/>
               </a:rPr>
-              <a:t>)</a:t>
-            </a:r>
-          </a:p>
-          <a:p>
-            <a:pPr lvl="1" indent="0"/>
+              <a:t> </a:t>
+            </a:r>
+            <a:r>
+              <a:rPr lang="de-DE" dirty="0" err="1">
+                <a:latin typeface="Frutiger Next LT W1G"/>
+              </a:rPr>
+              <a:t>is</a:t>
+            </a:r>
             <a:r>
               <a:rPr lang="de-DE" dirty="0">
                 <a:latin typeface="Frutiger Next LT W1G"/>
-                <a:sym typeface="Wingdings" panose="05000000000000000000" pitchFamily="2" charset="2"/>
-              </a:rPr>
-              <a:t></a:t>
+              </a:rPr>
+              <a:t> </a:t>
             </a:r>
             <a:r>
               <a:rPr lang="de-DE" dirty="0" err="1">
                 <a:latin typeface="Frutiger Next LT W1G"/>
-                <a:sym typeface="Wingdings" panose="05000000000000000000" pitchFamily="2" charset="2"/>
-              </a:rPr>
-              <a:t>use</a:t>
+              </a:rPr>
+              <a:t>no</a:t>
             </a:r>
             <a:r>
               <a:rPr lang="de-DE" dirty="0">
                 <a:latin typeface="Frutiger Next LT W1G"/>
-                <a:sym typeface="Wingdings" panose="05000000000000000000" pitchFamily="2" charset="2"/>
-              </a:rPr>
-              <a:t> SCM </a:t>
+              </a:rPr>
+              <a:t> </a:t>
             </a:r>
             <a:r>
               <a:rPr lang="de-DE" dirty="0" err="1">
                 <a:latin typeface="Frutiger Next LT W1G"/>
-                <a:sym typeface="Wingdings" panose="05000000000000000000" pitchFamily="2" charset="2"/>
-              </a:rPr>
-              <a:t>for</a:t>
+              </a:rPr>
+              <a:t>pending</a:t>
             </a:r>
             <a:r>
               <a:rPr lang="de-DE" dirty="0">
                 <a:latin typeface="Frutiger Next LT W1G"/>
-                <a:sym typeface="Wingdings" panose="05000000000000000000" pitchFamily="2" charset="2"/>
               </a:rPr>
               <a:t> </a:t>
             </a:r>
             <a:r>
               <a:rPr lang="de-DE" dirty="0" err="1">
                 <a:latin typeface="Frutiger Next LT W1G"/>
-                <a:sym typeface="Wingdings" panose="05000000000000000000" pitchFamily="2" charset="2"/>
-              </a:rPr>
-              <a:t>the</a:t>
+              </a:rPr>
+              <a:t>interaction</a:t>
             </a:r>
             <a:r>
               <a:rPr lang="de-DE" dirty="0">
                 <a:latin typeface="Frutiger Next LT W1G"/>
-                <a:sym typeface="Wingdings" panose="05000000000000000000" pitchFamily="2" charset="2"/>
               </a:rPr>
               <a:t> </a:t>
             </a:r>
             <a:r>
               <a:rPr lang="de-DE" dirty="0" err="1">
                 <a:latin typeface="Frutiger Next LT W1G"/>
-                <a:sym typeface="Wingdings" panose="05000000000000000000" pitchFamily="2" charset="2"/>
-              </a:rPr>
-              <a:t>whole</a:t>
+              </a:rPr>
+              <a:t>with</a:t>
             </a:r>
             <a:r>
               <a:rPr lang="de-DE" dirty="0">
                 <a:latin typeface="Frutiger Next LT W1G"/>
-                <a:sym typeface="Wingdings" panose="05000000000000000000" pitchFamily="2" charset="2"/>
               </a:rPr>
               <a:t> </a:t>
             </a:r>
             <a:r>
               <a:rPr lang="de-DE" dirty="0" err="1">
                 <a:latin typeface="Frutiger Next LT W1G"/>
-                <a:sym typeface="Wingdings" panose="05000000000000000000" pitchFamily="2" charset="2"/>
-              </a:rPr>
-              <a:t>study</a:t>
+              </a:rPr>
+              <a:t>other</a:t>
             </a:r>
             <a:r>
               <a:rPr lang="de-DE" dirty="0">
                 <a:latin typeface="Frutiger Next LT W1G"/>
-                <a:sym typeface="Wingdings" panose="05000000000000000000" pitchFamily="2" charset="2"/>
-              </a:rPr>
-              <a:t>, not just </a:t>
+              </a:rPr>
+              <a:t> </a:t>
             </a:r>
             <a:r>
               <a:rPr lang="de-DE" dirty="0" err="1">
                 <a:latin typeface="Frutiger Next LT W1G"/>
-                <a:sym typeface="Wingdings" panose="05000000000000000000" pitchFamily="2" charset="2"/>
-              </a:rPr>
-              <a:t>baseline</a:t>
-            </a:r>
-            <a:endParaRPr lang="de-DE" dirty="0">
-              <a:latin typeface="Frutiger Next LT W1G"/>
-            </a:endParaRPr>
-          </a:p>
-          <a:p>
-            <a:pPr marL="285750" indent="-285750">
-              <a:buFont typeface="Arial" panose="020B0604020202020204" pitchFamily="34" charset="0"/>
-              <a:buChar char="•"/>
-            </a:pPr>
+              </a:rPr>
+              <a:t>people</a:t>
+            </a:r>
             <a:endParaRPr lang="de-DE" dirty="0">
               <a:latin typeface="Frutiger Next LT W1G"/>
             </a:endParaRPr>
@@ -5210,6 +5486,191 @@
       <p:bldP spid="3" grpId="0" uiExpand="1" build="p"/>
     </p:bldLst>
   </p:timing>
+</p:sld>
+</file>
+
+<file path=ppt/slides/slide8.xml><?xml version="1.0" encoding="utf-8"?>
+<p:sld xmlns:a="http://schemas.openxmlformats.org/drawingml/2006/main" xmlns:r="http://schemas.openxmlformats.org/officeDocument/2006/relationships" xmlns:p="http://schemas.openxmlformats.org/presentationml/2006/main">
+  <p:cSld>
+    <p:spTree>
+      <p:nvGrpSpPr>
+        <p:cNvPr id="1" name=""/>
+        <p:cNvGrpSpPr/>
+        <p:nvPr/>
+      </p:nvGrpSpPr>
+      <p:grpSpPr>
+        <a:xfrm>
+          <a:off x="0" y="0"/>
+          <a:ext cx="0" cy="0"/>
+          <a:chOff x="0" y="0"/>
+          <a:chExt cx="0" cy="0"/>
+        </a:xfrm>
+      </p:grpSpPr>
+      <p:sp>
+        <p:nvSpPr>
+          <p:cNvPr id="2" name="Titel 1">
+            <a:extLst>
+              <a:ext uri="{FF2B5EF4-FFF2-40B4-BE49-F238E27FC236}">
+                <a16:creationId xmlns:a16="http://schemas.microsoft.com/office/drawing/2014/main" id="{8BDB588A-423F-436B-9F00-2956812B5111}"/>
+              </a:ext>
+            </a:extLst>
+          </p:cNvPr>
+          <p:cNvSpPr>
+            <a:spLocks noGrp="1"/>
+          </p:cNvSpPr>
+          <p:nvPr>
+            <p:ph type="title"/>
+          </p:nvPr>
+        </p:nvSpPr>
+        <p:spPr/>
+        <p:txBody>
+          <a:bodyPr/>
+          <a:lstStyle/>
+          <a:p>
+            <a:r>
+              <a:rPr lang="de-DE" dirty="0"/>
+              <a:t>References</a:t>
+            </a:r>
+          </a:p>
+        </p:txBody>
+      </p:sp>
+      <p:sp>
+        <p:nvSpPr>
+          <p:cNvPr id="3" name="Inhaltsplatzhalter 2">
+            <a:extLst>
+              <a:ext uri="{FF2B5EF4-FFF2-40B4-BE49-F238E27FC236}">
+                <a16:creationId xmlns:a16="http://schemas.microsoft.com/office/drawing/2014/main" id="{D9F37FB7-5372-4FFA-ABC9-E09F24EB958B}"/>
+              </a:ext>
+            </a:extLst>
+          </p:cNvPr>
+          <p:cNvSpPr>
+            <a:spLocks noGrp="1"/>
+          </p:cNvSpPr>
+          <p:nvPr>
+            <p:ph sz="half" idx="1"/>
+          </p:nvPr>
+        </p:nvSpPr>
+        <p:spPr/>
+        <p:txBody>
+          <a:bodyPr/>
+          <a:lstStyle/>
+          <a:p>
+            <a:r>
+              <a:rPr lang="en-US" dirty="0"/>
+              <a:t>[1] Norene Kelly. 2016. The WEAR Scale: Development of a measure of the social acceptability of a wearable device. (2016).</a:t>
+            </a:r>
+          </a:p>
+          <a:p>
+            <a:endParaRPr lang="en-US" dirty="0"/>
+          </a:p>
+          <a:p>
+            <a:r>
+              <a:rPr lang="de-DE" dirty="0"/>
+              <a:t>[2] Julie Rico and Stephen Brewster. 2010. </a:t>
+            </a:r>
+            <a:r>
+              <a:rPr lang="de-DE" dirty="0" err="1"/>
+              <a:t>Usable</a:t>
+            </a:r>
+            <a:r>
+              <a:rPr lang="de-DE" dirty="0"/>
+              <a:t> </a:t>
+            </a:r>
+            <a:r>
+              <a:rPr lang="de-DE" dirty="0" err="1"/>
+              <a:t>gestures</a:t>
+            </a:r>
+            <a:r>
+              <a:rPr lang="de-DE" dirty="0"/>
+              <a:t> </a:t>
+            </a:r>
+            <a:r>
+              <a:rPr lang="de-DE" dirty="0" err="1"/>
+              <a:t>for</a:t>
+            </a:r>
+            <a:r>
+              <a:rPr lang="de-DE" dirty="0"/>
+              <a:t> mobile </a:t>
+            </a:r>
+            <a:r>
+              <a:rPr lang="en-US" dirty="0"/>
+              <a:t>interfaces: evaluating social acceptability. In Proceedings of the SIGCHI Conference on Human Factors in Computing Systems. ACM, 887–896.</a:t>
+            </a:r>
+          </a:p>
+          <a:p>
+            <a:endParaRPr lang="en-US" dirty="0"/>
+          </a:p>
+          <a:p>
+            <a:r>
+              <a:rPr lang="de-DE" dirty="0"/>
+              <a:t>[3] Valentin Schwind, Niklas </a:t>
+            </a:r>
+            <a:r>
+              <a:rPr lang="de-DE" dirty="0" err="1"/>
+              <a:t>Deierlein</a:t>
+            </a:r>
+            <a:r>
+              <a:rPr lang="de-DE" dirty="0"/>
+              <a:t>, Romina Poguntke, and Niels Henze. </a:t>
+            </a:r>
+            <a:r>
+              <a:rPr lang="en-US" dirty="0"/>
+              <a:t>2019. Understanding the Social Acceptability of Mobile Devices using </a:t>
+            </a:r>
+            <a:r>
+              <a:rPr lang="de-DE" dirty="0" err="1"/>
+              <a:t>the</a:t>
+            </a:r>
+            <a:r>
+              <a:rPr lang="de-DE" dirty="0"/>
+              <a:t> Stereotype Content Model. (2019).</a:t>
+            </a:r>
+          </a:p>
+          <a:p>
+            <a:endParaRPr lang="de-DE" dirty="0"/>
+          </a:p>
+          <a:p>
+            <a:r>
+              <a:rPr lang="de-DE" dirty="0"/>
+              <a:t>[4] Valentin Schwind, Jens Reinhardt, </a:t>
+            </a:r>
+            <a:r>
+              <a:rPr lang="de-DE" dirty="0" err="1"/>
+              <a:t>Rufat</a:t>
+            </a:r>
+            <a:r>
+              <a:rPr lang="de-DE" dirty="0"/>
+              <a:t> </a:t>
+            </a:r>
+            <a:r>
+              <a:rPr lang="de-DE" dirty="0" err="1"/>
+              <a:t>Rzayev</a:t>
+            </a:r>
+            <a:r>
+              <a:rPr lang="de-DE" dirty="0"/>
+              <a:t>, Niels Henze, and Katrin </a:t>
+            </a:r>
+            <a:r>
+              <a:rPr lang="en-US" dirty="0"/>
+              <a:t>Wolf. 2018. Virtual reality on the go?: a study on social acceptance of VR glasses. In Proceedings of the 20th International Conference on </a:t>
+            </a:r>
+            <a:r>
+              <a:rPr lang="de-DE" dirty="0"/>
+              <a:t>Human-Computer</a:t>
+            </a:r>
+          </a:p>
+        </p:txBody>
+      </p:sp>
+    </p:spTree>
+    <p:extLst>
+      <p:ext uri="{BB962C8B-B14F-4D97-AF65-F5344CB8AC3E}">
+        <p14:creationId xmlns:p14="http://schemas.microsoft.com/office/powerpoint/2010/main" val="3885907135"/>
+      </p:ext>
+    </p:extLst>
+  </p:cSld>
+  <p:clrMapOvr>
+    <a:masterClrMapping/>
+  </p:clrMapOvr>
 </p:sld>
 </file>
 

</xml_diff>